<commit_message>
add business ai, lcnc badge
</commit_message>
<xml_diff>
--- a/badges.pptx
+++ b/badges.pptx
@@ -13,6 +13,7 @@
     <p:sldId id="261" r:id="rId7"/>
     <p:sldId id="262" r:id="rId8"/>
     <p:sldId id="263" r:id="rId9"/>
+    <p:sldId id="264" r:id="rId10"/>
   </p:sldIdLst>
   <p:sldSz cx="12192000" cy="6858000"/>
   <p:notesSz cx="6858000" cy="9144000"/>
@@ -358,7 +359,7 @@
           <a:p>
             <a:fld id="{C764DE79-268F-4C1A-8933-263129D2AF90}" type="datetimeFigureOut">
               <a:rPr lang="en-US" dirty="0"/>
-              <a:t>9/13/24</a:t>
+              <a:t>1/2/25</a:t>
             </a:fld>
             <a:endParaRPr lang="en-US" dirty="0"/>
           </a:p>
@@ -523,7 +524,7 @@
           <a:p>
             <a:fld id="{C764DE79-268F-4C1A-8933-263129D2AF90}" type="datetimeFigureOut">
               <a:rPr lang="en-US" dirty="0"/>
-              <a:t>9/13/24</a:t>
+              <a:t>1/2/25</a:t>
             </a:fld>
             <a:endParaRPr lang="en-US" dirty="0"/>
           </a:p>
@@ -698,7 +699,7 @@
           <a:p>
             <a:fld id="{C764DE79-268F-4C1A-8933-263129D2AF90}" type="datetimeFigureOut">
               <a:rPr lang="en-US" dirty="0"/>
-              <a:t>9/13/24</a:t>
+              <a:t>1/2/25</a:t>
             </a:fld>
             <a:endParaRPr lang="en-US" dirty="0"/>
           </a:p>
@@ -863,7 +864,7 @@
           <a:p>
             <a:fld id="{C764DE79-268F-4C1A-8933-263129D2AF90}" type="datetimeFigureOut">
               <a:rPr lang="en-US" dirty="0"/>
-              <a:t>9/13/24</a:t>
+              <a:t>1/2/25</a:t>
             </a:fld>
             <a:endParaRPr lang="en-US" dirty="0"/>
           </a:p>
@@ -1104,7 +1105,7 @@
           <a:p>
             <a:fld id="{C764DE79-268F-4C1A-8933-263129D2AF90}" type="datetimeFigureOut">
               <a:rPr lang="en-US" dirty="0"/>
-              <a:t>9/13/24</a:t>
+              <a:t>1/2/25</a:t>
             </a:fld>
             <a:endParaRPr lang="en-US" dirty="0"/>
           </a:p>
@@ -1331,7 +1332,7 @@
           <a:p>
             <a:fld id="{C764DE79-268F-4C1A-8933-263129D2AF90}" type="datetimeFigureOut">
               <a:rPr lang="en-US" dirty="0"/>
-              <a:t>9/13/24</a:t>
+              <a:t>1/2/25</a:t>
             </a:fld>
             <a:endParaRPr lang="en-US" dirty="0"/>
           </a:p>
@@ -1693,7 +1694,7 @@
           <a:p>
             <a:fld id="{C764DE79-268F-4C1A-8933-263129D2AF90}" type="datetimeFigureOut">
               <a:rPr lang="en-US" dirty="0"/>
-              <a:t>9/13/24</a:t>
+              <a:t>1/2/25</a:t>
             </a:fld>
             <a:endParaRPr lang="en-US" dirty="0"/>
           </a:p>
@@ -1806,7 +1807,7 @@
           <a:p>
             <a:fld id="{C764DE79-268F-4C1A-8933-263129D2AF90}" type="datetimeFigureOut">
               <a:rPr lang="en-US" dirty="0"/>
-              <a:t>9/13/24</a:t>
+              <a:t>1/2/25</a:t>
             </a:fld>
             <a:endParaRPr lang="en-US" dirty="0"/>
           </a:p>
@@ -1896,7 +1897,7 @@
           <a:p>
             <a:fld id="{C764DE79-268F-4C1A-8933-263129D2AF90}" type="datetimeFigureOut">
               <a:rPr lang="en-US" dirty="0"/>
-              <a:t>9/13/24</a:t>
+              <a:t>1/2/25</a:t>
             </a:fld>
             <a:endParaRPr lang="en-US" dirty="0"/>
           </a:p>
@@ -2168,7 +2169,7 @@
           <a:p>
             <a:fld id="{C764DE79-268F-4C1A-8933-263129D2AF90}" type="datetimeFigureOut">
               <a:rPr lang="en-US" dirty="0"/>
-              <a:t>9/13/24</a:t>
+              <a:t>1/2/25</a:t>
             </a:fld>
             <a:endParaRPr lang="en-US" dirty="0"/>
           </a:p>
@@ -2420,7 +2421,7 @@
           <a:p>
             <a:fld id="{C764DE79-268F-4C1A-8933-263129D2AF90}" type="datetimeFigureOut">
               <a:rPr lang="en-US" dirty="0"/>
-              <a:t>9/13/24</a:t>
+              <a:t>1/2/25</a:t>
             </a:fld>
             <a:endParaRPr lang="en-US" dirty="0"/>
           </a:p>
@@ -2628,7 +2629,7 @@
           <a:p>
             <a:fld id="{C764DE79-268F-4C1A-8933-263129D2AF90}" type="datetimeFigureOut">
               <a:rPr lang="en-US" dirty="0"/>
-              <a:t>9/13/24</a:t>
+              <a:t>1/2/25</a:t>
             </a:fld>
             <a:endParaRPr lang="en-US" dirty="0"/>
           </a:p>
@@ -11239,6 +11240,953 @@
 </p:sld>
 </file>
 
+<file path=ppt/slides/slide9.xml><?xml version="1.0" encoding="utf-8"?>
+<p:sld xmlns:a="http://schemas.openxmlformats.org/drawingml/2006/main" xmlns:r="http://schemas.openxmlformats.org/officeDocument/2006/relationships" xmlns:p="http://schemas.openxmlformats.org/presentationml/2006/main">
+  <p:cSld>
+    <p:spTree>
+      <p:nvGrpSpPr>
+        <p:cNvPr id="1" name="">
+          <a:extLst>
+            <a:ext uri="{FF2B5EF4-FFF2-40B4-BE49-F238E27FC236}">
+              <a16:creationId xmlns:a16="http://schemas.microsoft.com/office/drawing/2014/main" id="{C0D4414B-6983-B460-50B7-6D322B514675}"/>
+            </a:ext>
+          </a:extLst>
+        </p:cNvPr>
+        <p:cNvGrpSpPr/>
+        <p:nvPr/>
+      </p:nvGrpSpPr>
+      <p:grpSpPr>
+        <a:xfrm>
+          <a:off x="0" y="0"/>
+          <a:ext cx="0" cy="0"/>
+          <a:chOff x="0" y="0"/>
+          <a:chExt cx="0" cy="0"/>
+        </a:xfrm>
+      </p:grpSpPr>
+      <p:pic>
+        <p:nvPicPr>
+          <p:cNvPr id="2" name="Picture 1">
+            <a:extLst>
+              <a:ext uri="{FF2B5EF4-FFF2-40B4-BE49-F238E27FC236}">
+                <a16:creationId xmlns:a16="http://schemas.microsoft.com/office/drawing/2014/main" id="{B27DF6A4-06FF-605C-896D-4F94DF289E23}"/>
+              </a:ext>
+            </a:extLst>
+          </p:cNvPr>
+          <p:cNvPicPr>
+            <a:picLocks noChangeAspect="1"/>
+          </p:cNvPicPr>
+          <p:nvPr/>
+        </p:nvPicPr>
+        <p:blipFill>
+          <a:blip r:embed="rId2"/>
+          <a:stretch>
+            <a:fillRect/>
+          </a:stretch>
+        </p:blipFill>
+        <p:spPr>
+          <a:xfrm>
+            <a:off x="872746" y="823352"/>
+            <a:ext cx="1955800" cy="3378200"/>
+          </a:xfrm>
+          <a:prstGeom prst="rect">
+            <a:avLst/>
+          </a:prstGeom>
+        </p:spPr>
+      </p:pic>
+      <p:sp>
+        <p:nvSpPr>
+          <p:cNvPr id="3" name="Rectangle 2">
+            <a:extLst>
+              <a:ext uri="{FF2B5EF4-FFF2-40B4-BE49-F238E27FC236}">
+                <a16:creationId xmlns:a16="http://schemas.microsoft.com/office/drawing/2014/main" id="{43A24A3A-A3BF-972F-A6E7-ED1B468B68CE}"/>
+              </a:ext>
+            </a:extLst>
+          </p:cNvPr>
+          <p:cNvSpPr/>
+          <p:nvPr/>
+        </p:nvSpPr>
+        <p:spPr>
+          <a:xfrm>
+            <a:off x="1050321" y="1120033"/>
+            <a:ext cx="1643449" cy="2401643"/>
+          </a:xfrm>
+          <a:prstGeom prst="rect">
+            <a:avLst/>
+          </a:prstGeom>
+          <a:solidFill>
+            <a:schemeClr val="bg1"/>
+          </a:solidFill>
+          <a:ln>
+            <a:noFill/>
+          </a:ln>
+        </p:spPr>
+        <p:style>
+          <a:lnRef idx="2">
+            <a:schemeClr val="accent1">
+              <a:shade val="50000"/>
+            </a:schemeClr>
+          </a:lnRef>
+          <a:fillRef idx="1">
+            <a:schemeClr val="accent1"/>
+          </a:fillRef>
+          <a:effectRef idx="0">
+            <a:schemeClr val="accent1"/>
+          </a:effectRef>
+          <a:fontRef idx="minor">
+            <a:schemeClr val="lt1"/>
+          </a:fontRef>
+        </p:style>
+        <p:txBody>
+          <a:bodyPr rtlCol="0" anchor="ctr"/>
+          <a:lstStyle/>
+          <a:p>
+            <a:pPr algn="ctr"/>
+            <a:endParaRPr kumimoji="1" lang="zh-CN" altLang="en-US"/>
+          </a:p>
+        </p:txBody>
+      </p:sp>
+      <p:sp>
+        <p:nvSpPr>
+          <p:cNvPr id="4" name="Rectangle 3">
+            <a:extLst>
+              <a:ext uri="{FF2B5EF4-FFF2-40B4-BE49-F238E27FC236}">
+                <a16:creationId xmlns:a16="http://schemas.microsoft.com/office/drawing/2014/main" id="{CEEBD057-6E93-910A-290A-FE6F3F35F0A0}"/>
+              </a:ext>
+            </a:extLst>
+          </p:cNvPr>
+          <p:cNvSpPr/>
+          <p:nvPr/>
+        </p:nvSpPr>
+        <p:spPr>
+          <a:xfrm>
+            <a:off x="1158667" y="1200352"/>
+            <a:ext cx="1383959" cy="1277177"/>
+          </a:xfrm>
+          <a:prstGeom prst="rect">
+            <a:avLst/>
+          </a:prstGeom>
+          <a:blipFill>
+            <a:blip r:embed="rId3"/>
+            <a:stretch>
+              <a:fillRect/>
+            </a:stretch>
+          </a:blipFill>
+          <a:ln>
+            <a:noFill/>
+          </a:ln>
+        </p:spPr>
+        <p:style>
+          <a:lnRef idx="2">
+            <a:schemeClr val="accent1">
+              <a:shade val="50000"/>
+            </a:schemeClr>
+          </a:lnRef>
+          <a:fillRef idx="1">
+            <a:schemeClr val="accent1"/>
+          </a:fillRef>
+          <a:effectRef idx="0">
+            <a:schemeClr val="accent1"/>
+          </a:effectRef>
+          <a:fontRef idx="minor">
+            <a:schemeClr val="lt1"/>
+          </a:fontRef>
+        </p:style>
+        <p:txBody>
+          <a:bodyPr rtlCol="0" anchor="ctr"/>
+          <a:lstStyle/>
+          <a:p>
+            <a:pPr algn="ctr"/>
+            <a:endParaRPr kumimoji="1" lang="zh-CN" altLang="en-US" dirty="0"/>
+          </a:p>
+        </p:txBody>
+      </p:sp>
+      <p:sp>
+        <p:nvSpPr>
+          <p:cNvPr id="5" name="Rectangle 4">
+            <a:extLst>
+              <a:ext uri="{FF2B5EF4-FFF2-40B4-BE49-F238E27FC236}">
+                <a16:creationId xmlns:a16="http://schemas.microsoft.com/office/drawing/2014/main" id="{B3626BA6-F05E-16A4-752C-C18868CA20A3}"/>
+              </a:ext>
+            </a:extLst>
+          </p:cNvPr>
+          <p:cNvSpPr/>
+          <p:nvPr/>
+        </p:nvSpPr>
+        <p:spPr>
+          <a:xfrm>
+            <a:off x="1115261" y="2693900"/>
+            <a:ext cx="1513568" cy="778476"/>
+          </a:xfrm>
+          <a:prstGeom prst="rect">
+            <a:avLst/>
+          </a:prstGeom>
+          <a:solidFill>
+            <a:schemeClr val="bg1"/>
+          </a:solidFill>
+          <a:ln>
+            <a:noFill/>
+          </a:ln>
+        </p:spPr>
+        <p:style>
+          <a:lnRef idx="2">
+            <a:schemeClr val="accent1">
+              <a:shade val="50000"/>
+            </a:schemeClr>
+          </a:lnRef>
+          <a:fillRef idx="1">
+            <a:schemeClr val="accent1"/>
+          </a:fillRef>
+          <a:effectRef idx="0">
+            <a:schemeClr val="accent1"/>
+          </a:effectRef>
+          <a:fontRef idx="minor">
+            <a:schemeClr val="lt1"/>
+          </a:fontRef>
+        </p:style>
+        <p:txBody>
+          <a:bodyPr rtlCol="0" anchor="ctr"/>
+          <a:lstStyle/>
+          <a:p>
+            <a:pPr algn="ctr"/>
+            <a:r>
+              <a:rPr lang="en-US" altLang="zh-CN" sz="1400" b="1" i="0" u="none" strike="noStrike" dirty="0">
+                <a:solidFill>
+                  <a:srgbClr val="333333"/>
+                </a:solidFill>
+                <a:effectLst/>
+                <a:latin typeface="Helvetica" pitchFamily="2" charset="0"/>
+              </a:rPr>
+              <a:t>Business</a:t>
+            </a:r>
+            <a:r>
+              <a:rPr lang="zh-CN" altLang="en-US" sz="1400" b="1" i="0" u="none" strike="noStrike" dirty="0">
+                <a:solidFill>
+                  <a:srgbClr val="333333"/>
+                </a:solidFill>
+                <a:effectLst/>
+                <a:latin typeface="Helvetica" pitchFamily="2" charset="0"/>
+              </a:rPr>
+              <a:t> </a:t>
+            </a:r>
+            <a:r>
+              <a:rPr lang="en-US" altLang="zh-CN" sz="1400" b="1" i="0" u="none" strike="noStrike" dirty="0">
+                <a:solidFill>
+                  <a:srgbClr val="333333"/>
+                </a:solidFill>
+                <a:effectLst/>
+                <a:latin typeface="Helvetica" pitchFamily="2" charset="0"/>
+              </a:rPr>
+              <a:t>AI</a:t>
+            </a:r>
+            <a:r>
+              <a:rPr lang="en-US" sz="1400" b="1" i="0" u="none" strike="noStrike" dirty="0">
+                <a:solidFill>
+                  <a:srgbClr val="333333"/>
+                </a:solidFill>
+                <a:effectLst/>
+                <a:latin typeface="Helvetica" pitchFamily="2" charset="0"/>
+              </a:rPr>
+              <a:t> - SAP Generative AI Developer</a:t>
+            </a:r>
+            <a:endParaRPr kumimoji="1" lang="zh-CN" altLang="en-US" sz="1400" b="1" dirty="0">
+              <a:solidFill>
+                <a:schemeClr val="tx1"/>
+              </a:solidFill>
+            </a:endParaRPr>
+          </a:p>
+        </p:txBody>
+      </p:sp>
+      <p:pic>
+        <p:nvPicPr>
+          <p:cNvPr id="18" name="Picture 17">
+            <a:extLst>
+              <a:ext uri="{FF2B5EF4-FFF2-40B4-BE49-F238E27FC236}">
+                <a16:creationId xmlns:a16="http://schemas.microsoft.com/office/drawing/2014/main" id="{7EBF3A8D-BB84-67F0-58AF-DB934B36AF21}"/>
+              </a:ext>
+            </a:extLst>
+          </p:cNvPr>
+          <p:cNvPicPr>
+            <a:picLocks noChangeAspect="1"/>
+          </p:cNvPicPr>
+          <p:nvPr/>
+        </p:nvPicPr>
+        <p:blipFill>
+          <a:blip r:embed="rId2"/>
+          <a:stretch>
+            <a:fillRect/>
+          </a:stretch>
+        </p:blipFill>
+        <p:spPr>
+          <a:xfrm>
+            <a:off x="3508854" y="823352"/>
+            <a:ext cx="1955800" cy="3378200"/>
+          </a:xfrm>
+          <a:prstGeom prst="rect">
+            <a:avLst/>
+          </a:prstGeom>
+        </p:spPr>
+      </p:pic>
+      <p:sp>
+        <p:nvSpPr>
+          <p:cNvPr id="19" name="Rectangle 18">
+            <a:extLst>
+              <a:ext uri="{FF2B5EF4-FFF2-40B4-BE49-F238E27FC236}">
+                <a16:creationId xmlns:a16="http://schemas.microsoft.com/office/drawing/2014/main" id="{C0C6578A-34EF-0461-82ED-A9EE8E506F67}"/>
+              </a:ext>
+            </a:extLst>
+          </p:cNvPr>
+          <p:cNvSpPr/>
+          <p:nvPr/>
+        </p:nvSpPr>
+        <p:spPr>
+          <a:xfrm>
+            <a:off x="3686429" y="1120033"/>
+            <a:ext cx="1643449" cy="2401643"/>
+          </a:xfrm>
+          <a:prstGeom prst="rect">
+            <a:avLst/>
+          </a:prstGeom>
+          <a:solidFill>
+            <a:schemeClr val="bg1"/>
+          </a:solidFill>
+          <a:ln>
+            <a:noFill/>
+          </a:ln>
+        </p:spPr>
+        <p:style>
+          <a:lnRef idx="2">
+            <a:schemeClr val="accent1">
+              <a:shade val="50000"/>
+            </a:schemeClr>
+          </a:lnRef>
+          <a:fillRef idx="1">
+            <a:schemeClr val="accent1"/>
+          </a:fillRef>
+          <a:effectRef idx="0">
+            <a:schemeClr val="accent1"/>
+          </a:effectRef>
+          <a:fontRef idx="minor">
+            <a:schemeClr val="lt1"/>
+          </a:fontRef>
+        </p:style>
+        <p:txBody>
+          <a:bodyPr rtlCol="0" anchor="ctr"/>
+          <a:lstStyle/>
+          <a:p>
+            <a:pPr algn="ctr"/>
+            <a:endParaRPr kumimoji="1" lang="zh-CN" altLang="en-US"/>
+          </a:p>
+        </p:txBody>
+      </p:sp>
+      <p:sp>
+        <p:nvSpPr>
+          <p:cNvPr id="20" name="Rectangle 19">
+            <a:extLst>
+              <a:ext uri="{FF2B5EF4-FFF2-40B4-BE49-F238E27FC236}">
+                <a16:creationId xmlns:a16="http://schemas.microsoft.com/office/drawing/2014/main" id="{500B9520-2D14-EB2B-296C-8013D6A31D2C}"/>
+              </a:ext>
+            </a:extLst>
+          </p:cNvPr>
+          <p:cNvSpPr/>
+          <p:nvPr/>
+        </p:nvSpPr>
+        <p:spPr>
+          <a:xfrm>
+            <a:off x="3794775" y="1200352"/>
+            <a:ext cx="1383959" cy="1277177"/>
+          </a:xfrm>
+          <a:prstGeom prst="rect">
+            <a:avLst/>
+          </a:prstGeom>
+          <a:blipFill>
+            <a:blip r:embed="rId4"/>
+            <a:stretch>
+              <a:fillRect/>
+            </a:stretch>
+          </a:blipFill>
+          <a:ln>
+            <a:noFill/>
+          </a:ln>
+        </p:spPr>
+        <p:style>
+          <a:lnRef idx="2">
+            <a:schemeClr val="accent1">
+              <a:shade val="50000"/>
+            </a:schemeClr>
+          </a:lnRef>
+          <a:fillRef idx="1">
+            <a:schemeClr val="accent1"/>
+          </a:fillRef>
+          <a:effectRef idx="0">
+            <a:schemeClr val="accent1"/>
+          </a:effectRef>
+          <a:fontRef idx="minor">
+            <a:schemeClr val="lt1"/>
+          </a:fontRef>
+        </p:style>
+        <p:txBody>
+          <a:bodyPr rtlCol="0" anchor="ctr"/>
+          <a:lstStyle/>
+          <a:p>
+            <a:pPr algn="ctr"/>
+            <a:endParaRPr kumimoji="1" lang="zh-CN" altLang="en-US"/>
+          </a:p>
+        </p:txBody>
+      </p:sp>
+      <p:sp>
+        <p:nvSpPr>
+          <p:cNvPr id="21" name="Rectangle 20">
+            <a:extLst>
+              <a:ext uri="{FF2B5EF4-FFF2-40B4-BE49-F238E27FC236}">
+                <a16:creationId xmlns:a16="http://schemas.microsoft.com/office/drawing/2014/main" id="{EC93910D-1C1E-C181-2304-C3134C2BF4D8}"/>
+              </a:ext>
+            </a:extLst>
+          </p:cNvPr>
+          <p:cNvSpPr/>
+          <p:nvPr/>
+        </p:nvSpPr>
+        <p:spPr>
+          <a:xfrm>
+            <a:off x="3686429" y="2693900"/>
+            <a:ext cx="1578508" cy="778476"/>
+          </a:xfrm>
+          <a:prstGeom prst="rect">
+            <a:avLst/>
+          </a:prstGeom>
+          <a:solidFill>
+            <a:schemeClr val="bg1"/>
+          </a:solidFill>
+          <a:ln>
+            <a:noFill/>
+          </a:ln>
+        </p:spPr>
+        <p:style>
+          <a:lnRef idx="2">
+            <a:schemeClr val="accent1">
+              <a:shade val="50000"/>
+            </a:schemeClr>
+          </a:lnRef>
+          <a:fillRef idx="1">
+            <a:schemeClr val="accent1"/>
+          </a:fillRef>
+          <a:effectRef idx="0">
+            <a:schemeClr val="accent1"/>
+          </a:effectRef>
+          <a:fontRef idx="minor">
+            <a:schemeClr val="lt1"/>
+          </a:fontRef>
+        </p:style>
+        <p:txBody>
+          <a:bodyPr rtlCol="0" anchor="ctr"/>
+          <a:lstStyle/>
+          <a:p>
+            <a:pPr algn="ctr"/>
+            <a:r>
+              <a:rPr lang="en-US" altLang="zh-CN" sz="1400" b="1" dirty="0">
+                <a:solidFill>
+                  <a:srgbClr val="333333"/>
+                </a:solidFill>
+                <a:latin typeface="Helvetica" pitchFamily="2" charset="0"/>
+              </a:rPr>
+              <a:t>Low-Code/No-Code Developer - SAP Build</a:t>
+            </a:r>
+            <a:endParaRPr lang="zh-CN" altLang="en-US" sz="1400" b="1" dirty="0">
+              <a:solidFill>
+                <a:srgbClr val="333333"/>
+              </a:solidFill>
+              <a:latin typeface="Helvetica" pitchFamily="2" charset="0"/>
+            </a:endParaRPr>
+          </a:p>
+        </p:txBody>
+      </p:sp>
+      <p:pic>
+        <p:nvPicPr>
+          <p:cNvPr id="22" name="Picture 21">
+            <a:extLst>
+              <a:ext uri="{FF2B5EF4-FFF2-40B4-BE49-F238E27FC236}">
+                <a16:creationId xmlns:a16="http://schemas.microsoft.com/office/drawing/2014/main" id="{ED4FE043-2031-8331-E025-2EFD51CB7EB2}"/>
+              </a:ext>
+            </a:extLst>
+          </p:cNvPr>
+          <p:cNvPicPr>
+            <a:picLocks noChangeAspect="1"/>
+          </p:cNvPicPr>
+          <p:nvPr/>
+        </p:nvPicPr>
+        <p:blipFill>
+          <a:blip r:embed="rId2"/>
+          <a:stretch>
+            <a:fillRect/>
+          </a:stretch>
+        </p:blipFill>
+        <p:spPr>
+          <a:xfrm>
+            <a:off x="6144962" y="788429"/>
+            <a:ext cx="1955800" cy="3378200"/>
+          </a:xfrm>
+          <a:prstGeom prst="rect">
+            <a:avLst/>
+          </a:prstGeom>
+        </p:spPr>
+      </p:pic>
+      <p:sp>
+        <p:nvSpPr>
+          <p:cNvPr id="23" name="Rectangle 22">
+            <a:extLst>
+              <a:ext uri="{FF2B5EF4-FFF2-40B4-BE49-F238E27FC236}">
+                <a16:creationId xmlns:a16="http://schemas.microsoft.com/office/drawing/2014/main" id="{3767AD5F-078A-87D8-79E5-65DD66A9A96A}"/>
+              </a:ext>
+            </a:extLst>
+          </p:cNvPr>
+          <p:cNvSpPr/>
+          <p:nvPr/>
+        </p:nvSpPr>
+        <p:spPr>
+          <a:xfrm>
+            <a:off x="6322537" y="1085110"/>
+            <a:ext cx="1643449" cy="2401643"/>
+          </a:xfrm>
+          <a:prstGeom prst="rect">
+            <a:avLst/>
+          </a:prstGeom>
+          <a:solidFill>
+            <a:schemeClr val="bg1"/>
+          </a:solidFill>
+          <a:ln>
+            <a:noFill/>
+          </a:ln>
+        </p:spPr>
+        <p:style>
+          <a:lnRef idx="2">
+            <a:schemeClr val="accent1">
+              <a:shade val="50000"/>
+            </a:schemeClr>
+          </a:lnRef>
+          <a:fillRef idx="1">
+            <a:schemeClr val="accent1"/>
+          </a:fillRef>
+          <a:effectRef idx="0">
+            <a:schemeClr val="accent1"/>
+          </a:effectRef>
+          <a:fontRef idx="minor">
+            <a:schemeClr val="lt1"/>
+          </a:fontRef>
+        </p:style>
+        <p:txBody>
+          <a:bodyPr rtlCol="0" anchor="ctr"/>
+          <a:lstStyle/>
+          <a:p>
+            <a:pPr algn="ctr"/>
+            <a:endParaRPr kumimoji="1" lang="zh-CN" altLang="en-US"/>
+          </a:p>
+        </p:txBody>
+      </p:sp>
+      <p:sp>
+        <p:nvSpPr>
+          <p:cNvPr id="24" name="Rectangle 23">
+            <a:extLst>
+              <a:ext uri="{FF2B5EF4-FFF2-40B4-BE49-F238E27FC236}">
+                <a16:creationId xmlns:a16="http://schemas.microsoft.com/office/drawing/2014/main" id="{87AD6A8B-FFDE-57F5-EA6B-AB9B2FD22ECE}"/>
+              </a:ext>
+            </a:extLst>
+          </p:cNvPr>
+          <p:cNvSpPr/>
+          <p:nvPr/>
+        </p:nvSpPr>
+        <p:spPr>
+          <a:xfrm>
+            <a:off x="6430883" y="1165429"/>
+            <a:ext cx="1383959" cy="1277177"/>
+          </a:xfrm>
+          <a:prstGeom prst="rect">
+            <a:avLst/>
+          </a:prstGeom>
+          <a:blipFill>
+            <a:blip r:embed="rId5"/>
+            <a:stretch>
+              <a:fillRect/>
+            </a:stretch>
+          </a:blipFill>
+          <a:ln>
+            <a:noFill/>
+          </a:ln>
+        </p:spPr>
+        <p:style>
+          <a:lnRef idx="2">
+            <a:schemeClr val="accent1">
+              <a:shade val="50000"/>
+            </a:schemeClr>
+          </a:lnRef>
+          <a:fillRef idx="1">
+            <a:schemeClr val="accent1"/>
+          </a:fillRef>
+          <a:effectRef idx="0">
+            <a:schemeClr val="accent1"/>
+          </a:effectRef>
+          <a:fontRef idx="minor">
+            <a:schemeClr val="lt1"/>
+          </a:fontRef>
+        </p:style>
+        <p:txBody>
+          <a:bodyPr rtlCol="0" anchor="ctr"/>
+          <a:lstStyle/>
+          <a:p>
+            <a:pPr algn="ctr"/>
+            <a:endParaRPr kumimoji="1" lang="zh-CN" altLang="en-US"/>
+          </a:p>
+        </p:txBody>
+      </p:sp>
+      <p:sp>
+        <p:nvSpPr>
+          <p:cNvPr id="25" name="Rectangle 24">
+            <a:extLst>
+              <a:ext uri="{FF2B5EF4-FFF2-40B4-BE49-F238E27FC236}">
+                <a16:creationId xmlns:a16="http://schemas.microsoft.com/office/drawing/2014/main" id="{CD83C7D4-8B5D-096D-1EFE-1F1134D4CBB8}"/>
+              </a:ext>
+            </a:extLst>
+          </p:cNvPr>
+          <p:cNvSpPr/>
+          <p:nvPr/>
+        </p:nvSpPr>
+        <p:spPr>
+          <a:xfrm>
+            <a:off x="6387477" y="2658977"/>
+            <a:ext cx="1513568" cy="778476"/>
+          </a:xfrm>
+          <a:prstGeom prst="rect">
+            <a:avLst/>
+          </a:prstGeom>
+          <a:solidFill>
+            <a:schemeClr val="bg1"/>
+          </a:solidFill>
+          <a:ln>
+            <a:noFill/>
+          </a:ln>
+        </p:spPr>
+        <p:style>
+          <a:lnRef idx="2">
+            <a:schemeClr val="accent1">
+              <a:shade val="50000"/>
+            </a:schemeClr>
+          </a:lnRef>
+          <a:fillRef idx="1">
+            <a:schemeClr val="accent1"/>
+          </a:fillRef>
+          <a:effectRef idx="0">
+            <a:schemeClr val="accent1"/>
+          </a:effectRef>
+          <a:fontRef idx="minor">
+            <a:schemeClr val="lt1"/>
+          </a:fontRef>
+        </p:style>
+        <p:txBody>
+          <a:bodyPr rtlCol="0" anchor="ctr"/>
+          <a:lstStyle/>
+          <a:p>
+            <a:pPr algn="ctr" fontAlgn="base"/>
+            <a:r>
+              <a:rPr lang="en-US" sz="1050" b="1" i="0" dirty="0">
+                <a:solidFill>
+                  <a:srgbClr val="2E2E2E"/>
+                </a:solidFill>
+                <a:effectLst/>
+                <a:latin typeface="grad"/>
+              </a:rPr>
+              <a:t>Customer Value Accelerator</a:t>
+            </a:r>
+          </a:p>
+        </p:txBody>
+      </p:sp>
+      <p:pic>
+        <p:nvPicPr>
+          <p:cNvPr id="14" name="Picture 13">
+            <a:extLst>
+              <a:ext uri="{FF2B5EF4-FFF2-40B4-BE49-F238E27FC236}">
+                <a16:creationId xmlns:a16="http://schemas.microsoft.com/office/drawing/2014/main" id="{4D025ED2-E3F4-1AEF-F09E-2A64EE6F9F65}"/>
+              </a:ext>
+            </a:extLst>
+          </p:cNvPr>
+          <p:cNvPicPr>
+            <a:picLocks noChangeAspect="1"/>
+          </p:cNvPicPr>
+          <p:nvPr/>
+        </p:nvPicPr>
+        <p:blipFill>
+          <a:blip r:embed="rId2"/>
+          <a:stretch>
+            <a:fillRect/>
+          </a:stretch>
+        </p:blipFill>
+        <p:spPr>
+          <a:xfrm>
+            <a:off x="8781070" y="823352"/>
+            <a:ext cx="1955800" cy="3378200"/>
+          </a:xfrm>
+          <a:prstGeom prst="rect">
+            <a:avLst/>
+          </a:prstGeom>
+        </p:spPr>
+      </p:pic>
+      <p:sp>
+        <p:nvSpPr>
+          <p:cNvPr id="15" name="Rectangle 14">
+            <a:extLst>
+              <a:ext uri="{FF2B5EF4-FFF2-40B4-BE49-F238E27FC236}">
+                <a16:creationId xmlns:a16="http://schemas.microsoft.com/office/drawing/2014/main" id="{F0F30440-465A-772B-20FA-CE7B64843B1C}"/>
+              </a:ext>
+            </a:extLst>
+          </p:cNvPr>
+          <p:cNvSpPr/>
+          <p:nvPr/>
+        </p:nvSpPr>
+        <p:spPr>
+          <a:xfrm>
+            <a:off x="8958645" y="1120033"/>
+            <a:ext cx="1643449" cy="2401643"/>
+          </a:xfrm>
+          <a:prstGeom prst="rect">
+            <a:avLst/>
+          </a:prstGeom>
+          <a:solidFill>
+            <a:schemeClr val="bg1"/>
+          </a:solidFill>
+          <a:ln>
+            <a:noFill/>
+          </a:ln>
+        </p:spPr>
+        <p:style>
+          <a:lnRef idx="2">
+            <a:schemeClr val="accent1">
+              <a:shade val="50000"/>
+            </a:schemeClr>
+          </a:lnRef>
+          <a:fillRef idx="1">
+            <a:schemeClr val="accent1"/>
+          </a:fillRef>
+          <a:effectRef idx="0">
+            <a:schemeClr val="accent1"/>
+          </a:effectRef>
+          <a:fontRef idx="minor">
+            <a:schemeClr val="lt1"/>
+          </a:fontRef>
+        </p:style>
+        <p:txBody>
+          <a:bodyPr rtlCol="0" anchor="ctr"/>
+          <a:lstStyle/>
+          <a:p>
+            <a:pPr algn="ctr"/>
+            <a:endParaRPr kumimoji="1" lang="zh-CN" altLang="en-US"/>
+          </a:p>
+        </p:txBody>
+      </p:sp>
+      <p:sp>
+        <p:nvSpPr>
+          <p:cNvPr id="16" name="Rectangle 15">
+            <a:extLst>
+              <a:ext uri="{FF2B5EF4-FFF2-40B4-BE49-F238E27FC236}">
+                <a16:creationId xmlns:a16="http://schemas.microsoft.com/office/drawing/2014/main" id="{4F66693F-6DB9-9DB3-C7B6-1E8C00B5AC7F}"/>
+              </a:ext>
+            </a:extLst>
+          </p:cNvPr>
+          <p:cNvSpPr/>
+          <p:nvPr/>
+        </p:nvSpPr>
+        <p:spPr>
+          <a:xfrm>
+            <a:off x="9066991" y="1200352"/>
+            <a:ext cx="1383959" cy="1277177"/>
+          </a:xfrm>
+          <a:prstGeom prst="rect">
+            <a:avLst/>
+          </a:prstGeom>
+          <a:blipFill>
+            <a:blip r:embed="rId6"/>
+            <a:stretch>
+              <a:fillRect/>
+            </a:stretch>
+          </a:blipFill>
+          <a:ln>
+            <a:noFill/>
+          </a:ln>
+        </p:spPr>
+        <p:style>
+          <a:lnRef idx="2">
+            <a:schemeClr val="accent1">
+              <a:shade val="50000"/>
+            </a:schemeClr>
+          </a:lnRef>
+          <a:fillRef idx="1">
+            <a:schemeClr val="accent1"/>
+          </a:fillRef>
+          <a:effectRef idx="0">
+            <a:schemeClr val="accent1"/>
+          </a:effectRef>
+          <a:fontRef idx="minor">
+            <a:schemeClr val="lt1"/>
+          </a:fontRef>
+        </p:style>
+        <p:txBody>
+          <a:bodyPr rtlCol="0" anchor="ctr"/>
+          <a:lstStyle/>
+          <a:p>
+            <a:pPr algn="ctr"/>
+            <a:endParaRPr kumimoji="1" lang="zh-CN" altLang="en-US"/>
+          </a:p>
+        </p:txBody>
+      </p:sp>
+      <p:sp>
+        <p:nvSpPr>
+          <p:cNvPr id="17" name="Rectangle 16">
+            <a:extLst>
+              <a:ext uri="{FF2B5EF4-FFF2-40B4-BE49-F238E27FC236}">
+                <a16:creationId xmlns:a16="http://schemas.microsoft.com/office/drawing/2014/main" id="{8C796BE8-7DB3-7FEA-EFE7-4A2FC071B623}"/>
+              </a:ext>
+            </a:extLst>
+          </p:cNvPr>
+          <p:cNvSpPr/>
+          <p:nvPr/>
+        </p:nvSpPr>
+        <p:spPr>
+          <a:xfrm>
+            <a:off x="9023585" y="2693900"/>
+            <a:ext cx="1513568" cy="778476"/>
+          </a:xfrm>
+          <a:prstGeom prst="rect">
+            <a:avLst/>
+          </a:prstGeom>
+          <a:solidFill>
+            <a:schemeClr val="bg1"/>
+          </a:solidFill>
+          <a:ln>
+            <a:noFill/>
+          </a:ln>
+        </p:spPr>
+        <p:style>
+          <a:lnRef idx="2">
+            <a:schemeClr val="accent1">
+              <a:shade val="50000"/>
+            </a:schemeClr>
+          </a:lnRef>
+          <a:fillRef idx="1">
+            <a:schemeClr val="accent1"/>
+          </a:fillRef>
+          <a:effectRef idx="0">
+            <a:schemeClr val="accent1"/>
+          </a:effectRef>
+          <a:fontRef idx="minor">
+            <a:schemeClr val="lt1"/>
+          </a:fontRef>
+        </p:style>
+        <p:txBody>
+          <a:bodyPr rtlCol="0" anchor="ctr"/>
+          <a:lstStyle/>
+          <a:p>
+            <a:pPr algn="ctr"/>
+            <a:r>
+              <a:rPr kumimoji="1" lang="en-US" altLang="zh-CN" sz="1050" b="1" dirty="0">
+                <a:solidFill>
+                  <a:schemeClr val="tx1"/>
+                </a:solidFill>
+              </a:rPr>
+              <a:t>Integration Black Belt 2.0</a:t>
+            </a:r>
+            <a:endParaRPr kumimoji="1" lang="zh-CN" altLang="en-US" sz="1050" b="1" dirty="0">
+              <a:solidFill>
+                <a:schemeClr val="tx1"/>
+              </a:solidFill>
+            </a:endParaRPr>
+          </a:p>
+        </p:txBody>
+      </p:sp>
+      <p:sp>
+        <p:nvSpPr>
+          <p:cNvPr id="7" name="TextBox 6">
+            <a:extLst>
+              <a:ext uri="{FF2B5EF4-FFF2-40B4-BE49-F238E27FC236}">
+                <a16:creationId xmlns:a16="http://schemas.microsoft.com/office/drawing/2014/main" id="{82282EAB-AAB2-D637-8D2A-97FF75A23369}"/>
+              </a:ext>
+            </a:extLst>
+          </p:cNvPr>
+          <p:cNvSpPr txBox="1"/>
+          <p:nvPr/>
+        </p:nvSpPr>
+        <p:spPr>
+          <a:xfrm>
+            <a:off x="805526" y="4278859"/>
+            <a:ext cx="2023020" cy="369332"/>
+          </a:xfrm>
+          <a:prstGeom prst="rect">
+            <a:avLst/>
+          </a:prstGeom>
+          <a:noFill/>
+        </p:spPr>
+        <p:txBody>
+          <a:bodyPr wrap="square">
+            <a:spAutoFit/>
+          </a:bodyPr>
+          <a:lstStyle/>
+          <a:p>
+            <a:r>
+              <a:rPr lang="en-US" altLang="zh-CN" dirty="0">
+                <a:hlinkClick r:id="rId7"/>
+              </a:rPr>
+              <a:t>link</a:t>
+            </a:r>
+            <a:endParaRPr lang="zh-CN" altLang="en-US" dirty="0"/>
+          </a:p>
+        </p:txBody>
+      </p:sp>
+      <p:sp>
+        <p:nvSpPr>
+          <p:cNvPr id="9" name="TextBox 8">
+            <a:extLst>
+              <a:ext uri="{FF2B5EF4-FFF2-40B4-BE49-F238E27FC236}">
+                <a16:creationId xmlns:a16="http://schemas.microsoft.com/office/drawing/2014/main" id="{FF853AAB-C281-6557-C948-9F1ED1E1FAD9}"/>
+              </a:ext>
+            </a:extLst>
+          </p:cNvPr>
+          <p:cNvSpPr txBox="1"/>
+          <p:nvPr/>
+        </p:nvSpPr>
+        <p:spPr>
+          <a:xfrm>
+            <a:off x="3882683" y="4417255"/>
+            <a:ext cx="516488" cy="369332"/>
+          </a:xfrm>
+          <a:prstGeom prst="rect">
+            <a:avLst/>
+          </a:prstGeom>
+          <a:noFill/>
+        </p:spPr>
+        <p:txBody>
+          <a:bodyPr wrap="none" rtlCol="0">
+            <a:spAutoFit/>
+          </a:bodyPr>
+          <a:lstStyle/>
+          <a:p>
+            <a:r>
+              <a:rPr kumimoji="1" lang="en-US" altLang="zh-CN" dirty="0">
+                <a:hlinkClick r:id="rId8"/>
+              </a:rPr>
+              <a:t>link</a:t>
+            </a:r>
+            <a:endParaRPr kumimoji="1" lang="zh-CN" altLang="en-US" dirty="0"/>
+          </a:p>
+        </p:txBody>
+      </p:sp>
+    </p:spTree>
+    <p:extLst>
+      <p:ext uri="{BB962C8B-B14F-4D97-AF65-F5344CB8AC3E}">
+        <p14:creationId xmlns:p14="http://schemas.microsoft.com/office/powerpoint/2010/main" val="3653558581"/>
+      </p:ext>
+    </p:extLst>
+  </p:cSld>
+  <p:clrMapOvr>
+    <a:masterClrMapping/>
+  </p:clrMapOvr>
+</p:sld>
+</file>
+
 <file path=ppt/theme/theme1.xml><?xml version="1.0" encoding="utf-8"?>
 <a:theme xmlns:a="http://schemas.openxmlformats.org/drawingml/2006/main" name="Office Theme">
   <a:themeElements>

</xml_diff>